<commit_message>
Update after the Ondra Kucera merge request
</commit_message>
<xml_diff>
--- a/Pro lektory/Lekce01/Java1-01.pptx
+++ b/Pro lektory/Lekce01/Java1-01.pptx
@@ -5,42 +5,33 @@
     <p:sldMasterId id="2147483659" r:id="rId1"/>
   </p:sldMasterIdLst>
   <p:notesMasterIdLst>
-    <p:notesMasterId r:id="rId6"/>
+    <p:notesMasterId r:id="rId4"/>
   </p:notesMasterIdLst>
   <p:sldIdLst>
     <p:sldId id="256" r:id="rId2"/>
-    <p:sldId id="261" r:id="rId3"/>
-    <p:sldId id="269" r:id="rId4"/>
-    <p:sldId id="272" r:id="rId5"/>
+    <p:sldId id="272" r:id="rId3"/>
   </p:sldIdLst>
   <p:sldSz cx="12192000" cy="6858000"/>
   <p:notesSz cx="6858000" cy="9144000"/>
   <p:embeddedFontLst>
     <p:embeddedFont>
-      <p:font typeface="Amatic SC" panose="020B0604020202020204" charset="-79"/>
-      <p:regular r:id="rId7"/>
-      <p:bold r:id="rId8"/>
+      <p:font typeface="Open Sans" charset="0"/>
+      <p:regular r:id="rId5"/>
+      <p:bold r:id="rId6"/>
+      <p:italic r:id="rId7"/>
+      <p:boldItalic r:id="rId8"/>
     </p:embeddedFont>
     <p:embeddedFont>
-      <p:font typeface="Calibri" panose="020F0502020204030204" pitchFamily="34" charset="0"/>
+      <p:font typeface="Calibri" pitchFamily="34" charset="0"/>
       <p:regular r:id="rId9"/>
       <p:bold r:id="rId10"/>
       <p:italic r:id="rId11"/>
       <p:boldItalic r:id="rId12"/>
     </p:embeddedFont>
     <p:embeddedFont>
-      <p:font typeface="Consolas" panose="020B0609020204030204" pitchFamily="49" charset="0"/>
+      <p:font typeface="Amatic SC" charset="-79"/>
       <p:regular r:id="rId13"/>
       <p:bold r:id="rId14"/>
-      <p:italic r:id="rId15"/>
-      <p:boldItalic r:id="rId16"/>
-    </p:embeddedFont>
-    <p:embeddedFont>
-      <p:font typeface="Open Sans" panose="020B0606030504020204" pitchFamily="34" charset="0"/>
-      <p:regular r:id="rId17"/>
-      <p:bold r:id="rId18"/>
-      <p:italic r:id="rId19"/>
-      <p:boldItalic r:id="rId20"/>
     </p:embeddedFont>
   </p:embeddedFontLst>
   <p:defaultTextStyle>
@@ -620,107 +611,6 @@
 </p:notes>
 </file>
 
-<file path=ppt/notesSlides/notesSlide2.xml><?xml version="1.0" encoding="utf-8"?>
-<p:notes xmlns:a="http://schemas.openxmlformats.org/drawingml/2006/main" xmlns:r="http://schemas.openxmlformats.org/officeDocument/2006/relationships" xmlns:p="http://schemas.openxmlformats.org/presentationml/2006/main" showMasterSp="0" showMasterPhAnim="0">
-  <p:cSld>
-    <p:spTree>
-      <p:nvGrpSpPr>
-        <p:cNvPr id="1" name="Shape 84"/>
-        <p:cNvGrpSpPr/>
-        <p:nvPr/>
-      </p:nvGrpSpPr>
-      <p:grpSpPr>
-        <a:xfrm>
-          <a:off x="0" y="0"/>
-          <a:ext cx="0" cy="0"/>
-          <a:chOff x="0" y="0"/>
-          <a:chExt cx="0" cy="0"/>
-        </a:xfrm>
-      </p:grpSpPr>
-      <p:sp>
-        <p:nvSpPr>
-          <p:cNvPr id="85" name="Shape 85"/>
-          <p:cNvSpPr>
-            <a:spLocks noGrp="1" noRot="1" noChangeAspect="1"/>
-          </p:cNvSpPr>
-          <p:nvPr>
-            <p:ph type="sldImg" idx="2"/>
-          </p:nvPr>
-        </p:nvSpPr>
-        <p:spPr>
-          <a:xfrm>
-            <a:off x="381000" y="685800"/>
-            <a:ext cx="6096000" cy="3429000"/>
-          </a:xfrm>
-          <a:custGeom>
-            <a:avLst/>
-            <a:gdLst/>
-            <a:ahLst/>
-            <a:cxnLst/>
-            <a:rect l="0" t="0" r="0" b="0"/>
-            <a:pathLst>
-              <a:path w="120000" h="120000" extrusionOk="0">
-                <a:moveTo>
-                  <a:pt x="0" y="0"/>
-                </a:moveTo>
-                <a:lnTo>
-                  <a:pt x="120000" y="0"/>
-                </a:lnTo>
-                <a:lnTo>
-                  <a:pt x="120000" y="120000"/>
-                </a:lnTo>
-                <a:lnTo>
-                  <a:pt x="0" y="120000"/>
-                </a:lnTo>
-                <a:close/>
-              </a:path>
-            </a:pathLst>
-          </a:custGeom>
-        </p:spPr>
-      </p:sp>
-      <p:sp>
-        <p:nvSpPr>
-          <p:cNvPr id="86" name="Shape 86"/>
-          <p:cNvSpPr txBox="1">
-            <a:spLocks noGrp="1"/>
-          </p:cNvSpPr>
-          <p:nvPr>
-            <p:ph type="body" idx="1"/>
-          </p:nvPr>
-        </p:nvSpPr>
-        <p:spPr>
-          <a:xfrm>
-            <a:off x="685800" y="4343400"/>
-            <a:ext cx="5486400" cy="4114800"/>
-          </a:xfrm>
-          <a:prstGeom prst="rect">
-            <a:avLst/>
-          </a:prstGeom>
-        </p:spPr>
-        <p:txBody>
-          <a:bodyPr wrap="square" lIns="91425" tIns="91425" rIns="91425" bIns="91425" anchor="t" anchorCtr="0">
-            <a:noAutofit/>
-          </a:bodyPr>
-          <a:lstStyle/>
-          <a:p>
-            <a:pPr lvl="0" rtl="0">
-              <a:spcBef>
-                <a:spcPts val="0"/>
-              </a:spcBef>
-              <a:buNone/>
-            </a:pPr>
-            <a:endParaRPr/>
-          </a:p>
-        </p:txBody>
-      </p:sp>
-    </p:spTree>
-  </p:cSld>
-  <p:clrMapOvr>
-    <a:masterClrMapping/>
-  </p:clrMapOvr>
-</p:notes>
-</file>
-
 <file path=ppt/slideLayouts/slideLayout1.xml><?xml version="1.0" encoding="utf-8"?>
 <p:sldLayout xmlns:a="http://schemas.openxmlformats.org/drawingml/2006/main" xmlns:r="http://schemas.openxmlformats.org/officeDocument/2006/relationships" xmlns:p="http://schemas.openxmlformats.org/presentationml/2006/main" type="title">
   <p:cSld name="Uvodni snimek napravo">
@@ -1098,34 +988,6 @@
           </a:p>
         </p:txBody>
       </p:sp>
-      <p:pic>
-        <p:nvPicPr>
-          <p:cNvPr id="12" name="Shape 12" descr="logoesfcrnatmavem.png"/>
-          <p:cNvPicPr preferRelativeResize="0"/>
-          <p:nvPr/>
-        </p:nvPicPr>
-        <p:blipFill>
-          <a:blip r:embed="rId3">
-            <a:alphaModFix/>
-          </a:blip>
-          <a:stretch>
-            <a:fillRect/>
-          </a:stretch>
-        </p:blipFill>
-        <p:spPr>
-          <a:xfrm>
-            <a:off x="5784574" y="551825"/>
-            <a:ext cx="3003150" cy="516475"/>
-          </a:xfrm>
-          <a:prstGeom prst="rect">
-            <a:avLst/>
-          </a:prstGeom>
-          <a:noFill/>
-          <a:ln>
-            <a:noFill/>
-          </a:ln>
-        </p:spPr>
-      </p:pic>
     </p:spTree>
   </p:cSld>
   <p:clrMapOvr>
@@ -1510,34 +1372,6 @@
           </a:p>
         </p:txBody>
       </p:sp>
-      <p:pic>
-        <p:nvPicPr>
-          <p:cNvPr id="16" name="Shape 16" descr="logoesfcrnatmavem.png"/>
-          <p:cNvPicPr preferRelativeResize="0"/>
-          <p:nvPr/>
-        </p:nvPicPr>
-        <p:blipFill>
-          <a:blip r:embed="rId3">
-            <a:alphaModFix/>
-          </a:blip>
-          <a:stretch>
-            <a:fillRect/>
-          </a:stretch>
-        </p:blipFill>
-        <p:spPr>
-          <a:xfrm>
-            <a:off x="5784574" y="551825"/>
-            <a:ext cx="3003150" cy="516475"/>
-          </a:xfrm>
-          <a:prstGeom prst="rect">
-            <a:avLst/>
-          </a:prstGeom>
-          <a:noFill/>
-          <a:ln>
-            <a:noFill/>
-          </a:ln>
-        </p:spPr>
-      </p:pic>
     </p:spTree>
   </p:cSld>
   <p:clrMapOvr>
@@ -1923,75 +1757,6 @@
           </a:p>
         </p:txBody>
       </p:sp>
-      <p:pic>
-        <p:nvPicPr>
-          <p:cNvPr id="20" name="Shape 20" descr="logoesfcrnatmavem.png"/>
-          <p:cNvPicPr preferRelativeResize="0"/>
-          <p:nvPr/>
-        </p:nvPicPr>
-        <p:blipFill>
-          <a:blip r:embed="rId3">
-            <a:alphaModFix/>
-          </a:blip>
-          <a:stretch>
-            <a:fillRect/>
-          </a:stretch>
-        </p:blipFill>
-        <p:spPr>
-          <a:xfrm>
-            <a:off x="4594425" y="551825"/>
-            <a:ext cx="3003150" cy="516475"/>
-          </a:xfrm>
-          <a:prstGeom prst="rect">
-            <a:avLst/>
-          </a:prstGeom>
-          <a:noFill/>
-          <a:ln>
-            <a:noFill/>
-          </a:ln>
-        </p:spPr>
-      </p:pic>
-      <p:pic>
-        <p:nvPicPr>
-          <p:cNvPr id="5" name="Picture 2" descr="C:\Prace\!Courses\332. Czechitas - Java 2 Web\Marketing - JetBrains\jetbrains_logos\logo_JetBrains_4.png"/>
-          <p:cNvPicPr>
-            <a:picLocks noChangeAspect="1" noChangeArrowheads="1"/>
-          </p:cNvPicPr>
-          <p:nvPr userDrawn="1"/>
-        </p:nvPicPr>
-        <p:blipFill>
-          <a:blip r:embed="rId4">
-            <a:extLst>
-              <a:ext uri="{28A0092B-C50C-407E-A947-70E740481C1C}">
-                <a14:useLocalDpi xmlns:a14="http://schemas.microsoft.com/office/drawing/2010/main" val="0"/>
-              </a:ext>
-            </a:extLst>
-          </a:blip>
-          <a:srcRect/>
-          <a:stretch>
-            <a:fillRect/>
-          </a:stretch>
-        </p:blipFill>
-        <p:spPr bwMode="auto">
-          <a:xfrm>
-            <a:off x="474390" y="-380563"/>
-            <a:ext cx="2381250" cy="2381250"/>
-          </a:xfrm>
-          <a:prstGeom prst="rect">
-            <a:avLst/>
-          </a:prstGeom>
-          <a:noFill/>
-          <a:extLst>
-            <a:ext uri="{909E8E84-426E-40DD-AFC4-6F175D3DCCD1}">
-              <a14:hiddenFill xmlns:a14="http://schemas.microsoft.com/office/drawing/2010/main">
-                <a:solidFill>
-                  <a:srgbClr val="FFFFFF"/>
-                </a:solidFill>
-              </a14:hiddenFill>
-            </a:ext>
-          </a:extLst>
-        </p:spPr>
-      </p:pic>
     </p:spTree>
   </p:cSld>
   <p:clrMapOvr>
@@ -2389,75 +2154,6 @@
           </a:p>
         </p:txBody>
       </p:sp>
-      <p:pic>
-        <p:nvPicPr>
-          <p:cNvPr id="25" name="Shape 25" descr="Logo-OPZ-barevné_170816_163502.jpg"/>
-          <p:cNvPicPr preferRelativeResize="0"/>
-          <p:nvPr/>
-        </p:nvPicPr>
-        <p:blipFill>
-          <a:blip r:embed="rId3">
-            <a:alphaModFix/>
-          </a:blip>
-          <a:stretch>
-            <a:fillRect/>
-          </a:stretch>
-        </p:blipFill>
-        <p:spPr>
-          <a:xfrm>
-            <a:off x="1079775" y="5965974"/>
-            <a:ext cx="2835824" cy="589870"/>
-          </a:xfrm>
-          <a:prstGeom prst="rect">
-            <a:avLst/>
-          </a:prstGeom>
-          <a:noFill/>
-          <a:ln>
-            <a:noFill/>
-          </a:ln>
-        </p:spPr>
-      </p:pic>
-      <p:pic>
-        <p:nvPicPr>
-          <p:cNvPr id="6" name="Picture 2" descr="C:\Prace\!Courses\332. Czechitas - Java 2 Web\Marketing - JetBrains\jetbrains_logos\logo_JetBrains_4.png"/>
-          <p:cNvPicPr>
-            <a:picLocks noChangeAspect="1" noChangeArrowheads="1"/>
-          </p:cNvPicPr>
-          <p:nvPr userDrawn="1"/>
-        </p:nvPicPr>
-        <p:blipFill>
-          <a:blip r:embed="rId4">
-            <a:extLst>
-              <a:ext uri="{28A0092B-C50C-407E-A947-70E740481C1C}">
-                <a14:useLocalDpi xmlns:a14="http://schemas.microsoft.com/office/drawing/2010/main" val="0"/>
-              </a:ext>
-            </a:extLst>
-          </a:blip>
-          <a:srcRect/>
-          <a:stretch>
-            <a:fillRect/>
-          </a:stretch>
-        </p:blipFill>
-        <p:spPr bwMode="auto">
-          <a:xfrm>
-            <a:off x="9264352" y="5048548"/>
-            <a:ext cx="2381250" cy="2381250"/>
-          </a:xfrm>
-          <a:prstGeom prst="rect">
-            <a:avLst/>
-          </a:prstGeom>
-          <a:noFill/>
-          <a:extLst>
-            <a:ext uri="{909E8E84-426E-40DD-AFC4-6F175D3DCCD1}">
-              <a14:hiddenFill xmlns:a14="http://schemas.microsoft.com/office/drawing/2010/main">
-                <a:solidFill>
-                  <a:srgbClr val="FFFFFF"/>
-                </a:solidFill>
-              </a14:hiddenFill>
-            </a:ext>
-          </a:extLst>
-        </p:spPr>
-      </p:pic>
     </p:spTree>
   </p:cSld>
   <p:clrMapOvr>
@@ -2886,34 +2582,6 @@
           </a:p>
         </p:txBody>
       </p:sp>
-      <p:pic>
-        <p:nvPicPr>
-          <p:cNvPr id="30" name="Shape 30" descr="Logo-OPZ-barevné_170816_163502.jpg"/>
-          <p:cNvPicPr preferRelativeResize="0"/>
-          <p:nvPr/>
-        </p:nvPicPr>
-        <p:blipFill>
-          <a:blip r:embed="rId3">
-            <a:alphaModFix/>
-          </a:blip>
-          <a:stretch>
-            <a:fillRect/>
-          </a:stretch>
-        </p:blipFill>
-        <p:spPr>
-          <a:xfrm>
-            <a:off x="1079775" y="5965974"/>
-            <a:ext cx="2835824" cy="589870"/>
-          </a:xfrm>
-          <a:prstGeom prst="rect">
-            <a:avLst/>
-          </a:prstGeom>
-          <a:noFill/>
-          <a:ln>
-            <a:noFill/>
-          </a:ln>
-        </p:spPr>
-      </p:pic>
     </p:spTree>
   </p:cSld>
   <p:clrMapOvr>
@@ -3122,34 +2790,6 @@
           </a:p>
         </p:txBody>
       </p:sp>
-      <p:pic>
-        <p:nvPicPr>
-          <p:cNvPr id="39" name="Shape 39" descr="Logo-OPZ-barevné_170816_163502.jpg"/>
-          <p:cNvPicPr preferRelativeResize="0"/>
-          <p:nvPr/>
-        </p:nvPicPr>
-        <p:blipFill>
-          <a:blip r:embed="rId3">
-            <a:alphaModFix/>
-          </a:blip>
-          <a:stretch>
-            <a:fillRect/>
-          </a:stretch>
-        </p:blipFill>
-        <p:spPr>
-          <a:xfrm>
-            <a:off x="1079775" y="5965974"/>
-            <a:ext cx="2835824" cy="589870"/>
-          </a:xfrm>
-          <a:prstGeom prst="rect">
-            <a:avLst/>
-          </a:prstGeom>
-          <a:noFill/>
-          <a:ln>
-            <a:noFill/>
-          </a:ln>
-        </p:spPr>
-      </p:pic>
     </p:spTree>
   </p:cSld>
   <p:clrMapOvr>
@@ -3584,34 +3224,6 @@
           </a:p>
         </p:txBody>
       </p:sp>
-      <p:pic>
-        <p:nvPicPr>
-          <p:cNvPr id="54" name="Shape 54" descr="Logo-OPZ-barevné_170816_163502.jpg"/>
-          <p:cNvPicPr preferRelativeResize="0"/>
-          <p:nvPr/>
-        </p:nvPicPr>
-        <p:blipFill>
-          <a:blip r:embed="rId3">
-            <a:alphaModFix/>
-          </a:blip>
-          <a:stretch>
-            <a:fillRect/>
-          </a:stretch>
-        </p:blipFill>
-        <p:spPr>
-          <a:xfrm>
-            <a:off x="1079775" y="5965974"/>
-            <a:ext cx="2835824" cy="589870"/>
-          </a:xfrm>
-          <a:prstGeom prst="rect">
-            <a:avLst/>
-          </a:prstGeom>
-          <a:noFill/>
-          <a:ln>
-            <a:noFill/>
-          </a:ln>
-        </p:spPr>
-      </p:pic>
     </p:spTree>
   </p:cSld>
   <p:clrMapOvr>
@@ -4605,493 +4217,6 @@
   <p:cSld>
     <p:spTree>
       <p:nvGrpSpPr>
-        <p:cNvPr id="1" name="Shape 87"/>
-        <p:cNvGrpSpPr/>
-        <p:nvPr/>
-      </p:nvGrpSpPr>
-      <p:grpSpPr>
-        <a:xfrm>
-          <a:off x="0" y="0"/>
-          <a:ext cx="0" cy="0"/>
-          <a:chOff x="0" y="0"/>
-          <a:chExt cx="0" cy="0"/>
-        </a:xfrm>
-      </p:grpSpPr>
-      <p:sp>
-        <p:nvSpPr>
-          <p:cNvPr id="88" name="Shape 88"/>
-          <p:cNvSpPr txBox="1">
-            <a:spLocks noGrp="1"/>
-          </p:cNvSpPr>
-          <p:nvPr>
-            <p:ph type="body" idx="1"/>
-          </p:nvPr>
-        </p:nvSpPr>
-        <p:spPr>
-          <a:xfrm>
-            <a:off x="964659" y="1378150"/>
-            <a:ext cx="10134600" cy="4409700"/>
-          </a:xfrm>
-          <a:prstGeom prst="rect">
-            <a:avLst/>
-          </a:prstGeom>
-        </p:spPr>
-        <p:txBody>
-          <a:bodyPr wrap="square" lIns="91425" tIns="91425" rIns="91425" bIns="91425" anchor="ctr" anchorCtr="0">
-            <a:normAutofit/>
-          </a:bodyPr>
-          <a:lstStyle/>
-          <a:p>
-            <a:pPr marL="0" indent="0">
-              <a:buNone/>
-            </a:pPr>
-            <a:r>
-              <a:rPr lang="cs-CZ"/>
-              <a:t>Náš web: </a:t>
-            </a:r>
-            <a:r>
-              <a:rPr lang="cs-CZ" b="1"/>
-              <a:t>http://javabrno.czechitas.cz</a:t>
-            </a:r>
-            <a:r>
-              <a:rPr lang="cs-CZ" b="1" smtClean="0"/>
-              <a:t>/</a:t>
-            </a:r>
-            <a:endParaRPr lang="cs-CZ" b="1"/>
-          </a:p>
-          <a:p>
-            <a:pPr marL="0" indent="0">
-              <a:buNone/>
-            </a:pPr>
-            <a:endParaRPr lang="cs-CZ" smtClean="0"/>
-          </a:p>
-          <a:p>
-            <a:pPr marL="0" indent="0">
-              <a:buNone/>
-            </a:pPr>
-            <a:r>
-              <a:rPr lang="cs-CZ" smtClean="0"/>
-              <a:t>Obsah flashky si nakopíruj do </a:t>
-            </a:r>
-            <a:r>
-              <a:rPr lang="cs-CZ" b="1" smtClean="0"/>
-              <a:t>C:\Java-Training</a:t>
-            </a:r>
-            <a:r>
-              <a:rPr lang="cs-CZ" smtClean="0"/>
-              <a:t> (Windows) nebo </a:t>
-            </a:r>
-            <a:r>
-              <a:rPr lang="cs-CZ" b="1" smtClean="0"/>
-              <a:t>/Users/TVUJ_UZIVATEL/Java-Training</a:t>
-            </a:r>
-            <a:r>
-              <a:rPr lang="cs-CZ" smtClean="0"/>
-              <a:t> (Mac)</a:t>
-            </a:r>
-            <a:endParaRPr lang="cs-CZ"/>
-          </a:p>
-          <a:p>
-            <a:pPr marL="0" indent="0">
-              <a:buNone/>
-            </a:pPr>
-            <a:endParaRPr lang="cs-CZ"/>
-          </a:p>
-          <a:p>
-            <a:pPr marL="0" indent="0">
-              <a:buNone/>
-            </a:pPr>
-            <a:r>
-              <a:rPr lang="cs-CZ"/>
-              <a:t>WIFI: </a:t>
-            </a:r>
-            <a:r>
-              <a:rPr lang="cs-CZ" b="1">
-                <a:latin typeface="Consolas" pitchFamily="49" charset="0"/>
-                <a:cs typeface="Consolas" pitchFamily="49" charset="0"/>
-              </a:rPr>
-              <a:t>WLAN_FI</a:t>
-            </a:r>
-          </a:p>
-          <a:p>
-            <a:pPr marL="457200" lvl="1" indent="0">
-              <a:buNone/>
-            </a:pPr>
-            <a:r>
-              <a:rPr lang="cs-CZ"/>
-              <a:t>Po připojení běžte na </a:t>
-            </a:r>
-            <a:r>
-              <a:rPr lang="cs-CZ" b="1">
-                <a:latin typeface="Consolas" pitchFamily="49" charset="0"/>
-                <a:cs typeface="Consolas" pitchFamily="49" charset="0"/>
-              </a:rPr>
-              <a:t>http://wifi.fi.muni.cz/</a:t>
-            </a:r>
-          </a:p>
-          <a:p>
-            <a:pPr marL="457200" lvl="1" indent="0">
-              <a:buNone/>
-            </a:pPr>
-            <a:r>
-              <a:rPr lang="cs-CZ"/>
-              <a:t>Login: </a:t>
-            </a:r>
-            <a:r>
-              <a:rPr lang="cs-CZ" b="1">
-                <a:latin typeface="Consolas" pitchFamily="49" charset="0"/>
-                <a:cs typeface="Consolas" pitchFamily="49" charset="0"/>
-              </a:rPr>
-              <a:t>kurzczechitas</a:t>
-            </a:r>
-          </a:p>
-          <a:p>
-            <a:pPr marL="457200" lvl="1" indent="0">
-              <a:buNone/>
-            </a:pPr>
-            <a:r>
-              <a:rPr lang="cs-CZ"/>
-              <a:t>Heslo: </a:t>
-            </a:r>
-            <a:r>
-              <a:rPr lang="cs-CZ" b="1" smtClean="0">
-                <a:latin typeface="Consolas" pitchFamily="49" charset="0"/>
-                <a:cs typeface="Consolas" pitchFamily="49" charset="0"/>
-              </a:rPr>
-              <a:t>allyearround</a:t>
-            </a:r>
-            <a:endParaRPr lang="cs-CZ" b="1">
-              <a:latin typeface="Consolas" pitchFamily="49" charset="0"/>
-              <a:cs typeface="Consolas" pitchFamily="49" charset="0"/>
-            </a:endParaRPr>
-          </a:p>
-        </p:txBody>
-      </p:sp>
-      <p:sp>
-        <p:nvSpPr>
-          <p:cNvPr id="89" name="Shape 89"/>
-          <p:cNvSpPr txBox="1">
-            <a:spLocks noGrp="1"/>
-          </p:cNvSpPr>
-          <p:nvPr>
-            <p:ph type="title"/>
-          </p:nvPr>
-        </p:nvSpPr>
-        <p:spPr>
-          <a:xfrm>
-            <a:off x="964659" y="528468"/>
-            <a:ext cx="8325300" cy="821700"/>
-          </a:xfrm>
-          <a:prstGeom prst="rect">
-            <a:avLst/>
-          </a:prstGeom>
-        </p:spPr>
-        <p:txBody>
-          <a:bodyPr wrap="square" lIns="91425" tIns="91425" rIns="91425" bIns="91425" anchor="ctr" anchorCtr="0">
-            <a:noAutofit/>
-          </a:bodyPr>
-          <a:lstStyle/>
-          <a:p>
-            <a:pPr lvl="0" rtl="0">
-              <a:spcBef>
-                <a:spcPts val="0"/>
-              </a:spcBef>
-              <a:buNone/>
-            </a:pPr>
-            <a:r>
-              <a:rPr lang="cs-CZ" smtClean="0"/>
-              <a:t>Kurz Java 1</a:t>
-            </a:r>
-            <a:endParaRPr lang="en-US"/>
-          </a:p>
-        </p:txBody>
-      </p:sp>
-    </p:spTree>
-  </p:cSld>
-  <p:clrMapOvr>
-    <a:masterClrMapping/>
-  </p:clrMapOvr>
-</p:sld>
-</file>
-
-<file path=ppt/slides/slide3.xml><?xml version="1.0" encoding="utf-8"?>
-<p:sld xmlns:a="http://schemas.openxmlformats.org/drawingml/2006/main" xmlns:r="http://schemas.openxmlformats.org/officeDocument/2006/relationships" xmlns:p="http://schemas.openxmlformats.org/presentationml/2006/main">
-  <p:cSld>
-    <p:spTree>
-      <p:nvGrpSpPr>
-        <p:cNvPr id="1" name=""/>
-        <p:cNvGrpSpPr/>
-        <p:nvPr/>
-      </p:nvGrpSpPr>
-      <p:grpSpPr>
-        <a:xfrm>
-          <a:off x="0" y="0"/>
-          <a:ext cx="0" cy="0"/>
-          <a:chOff x="0" y="0"/>
-          <a:chExt cx="0" cy="0"/>
-        </a:xfrm>
-      </p:grpSpPr>
-      <p:sp>
-        <p:nvSpPr>
-          <p:cNvPr id="3" name="Title 2"/>
-          <p:cNvSpPr>
-            <a:spLocks noGrp="1"/>
-          </p:cNvSpPr>
-          <p:nvPr>
-            <p:ph type="title"/>
-          </p:nvPr>
-        </p:nvSpPr>
-        <p:spPr/>
-        <p:txBody>
-          <a:bodyPr/>
-          <a:lstStyle/>
-          <a:p>
-            <a:r>
-              <a:rPr lang="cs-CZ" smtClean="0"/>
-              <a:t>Termíny lekcí</a:t>
-            </a:r>
-            <a:endParaRPr lang="cs-CZ"/>
-          </a:p>
-        </p:txBody>
-      </p:sp>
-      <p:sp>
-        <p:nvSpPr>
-          <p:cNvPr id="4" name="Content Placeholder 2"/>
-          <p:cNvSpPr>
-            <a:spLocks noGrp="1"/>
-          </p:cNvSpPr>
-          <p:nvPr>
-            <p:ph type="body" idx="1"/>
-          </p:nvPr>
-        </p:nvSpPr>
-        <p:spPr>
-          <a:xfrm>
-            <a:off x="1919536" y="1340768"/>
-            <a:ext cx="9323738" cy="4409805"/>
-          </a:xfrm>
-        </p:spPr>
-        <p:txBody>
-          <a:bodyPr>
-            <a:normAutofit fontScale="77500" lnSpcReduction="20000"/>
-          </a:bodyPr>
-          <a:lstStyle/>
-          <a:p>
-            <a:pPr marL="0" indent="0">
-              <a:buNone/>
-              <a:tabLst>
-                <a:tab pos="500063" algn="l"/>
-                <a:tab pos="1001713" algn="l"/>
-              </a:tabLst>
-            </a:pPr>
-            <a:r>
-              <a:rPr lang="cs-CZ" b="1" smtClean="0"/>
-              <a:t>  4.	10.	2018 (dnešní lekce)</a:t>
-            </a:r>
-          </a:p>
-          <a:p>
-            <a:pPr marL="0" indent="0">
-              <a:buNone/>
-              <a:tabLst>
-                <a:tab pos="500063" algn="l"/>
-                <a:tab pos="1001713" algn="l"/>
-              </a:tabLst>
-            </a:pPr>
-            <a:r>
-              <a:rPr lang="cs-CZ" smtClean="0"/>
-              <a:t>11.	10.	2018</a:t>
-            </a:r>
-          </a:p>
-          <a:p>
-            <a:pPr marL="0" indent="0">
-              <a:buNone/>
-              <a:tabLst>
-                <a:tab pos="500063" algn="l"/>
-                <a:tab pos="1001713" algn="l"/>
-              </a:tabLst>
-            </a:pPr>
-            <a:r>
-              <a:rPr lang="cs-CZ" smtClean="0"/>
-              <a:t>18.	10.	2018</a:t>
-            </a:r>
-          </a:p>
-          <a:p>
-            <a:pPr marL="0" indent="0">
-              <a:buNone/>
-              <a:tabLst>
-                <a:tab pos="500063" algn="l"/>
-                <a:tab pos="1001713" algn="l"/>
-              </a:tabLst>
-            </a:pPr>
-            <a:r>
-              <a:rPr lang="cs-CZ" smtClean="0"/>
-              <a:t>25.	10.	2018</a:t>
-            </a:r>
-          </a:p>
-          <a:p>
-            <a:pPr marL="0" indent="0">
-              <a:buNone/>
-              <a:tabLst>
-                <a:tab pos="500063" algn="l"/>
-                <a:tab pos="1001713" algn="l"/>
-              </a:tabLst>
-            </a:pPr>
-            <a:r>
-              <a:rPr lang="cs-CZ" smtClean="0"/>
-              <a:t>  1.	11.	2018</a:t>
-            </a:r>
-          </a:p>
-          <a:p>
-            <a:pPr marL="0" indent="0">
-              <a:buNone/>
-              <a:tabLst>
-                <a:tab pos="500063" algn="l"/>
-                <a:tab pos="1001713" algn="l"/>
-              </a:tabLst>
-            </a:pPr>
-            <a:r>
-              <a:rPr lang="cs-CZ" smtClean="0"/>
-              <a:t>  8.	11.	2018</a:t>
-            </a:r>
-          </a:p>
-          <a:p>
-            <a:pPr marL="0" indent="0">
-              <a:buNone/>
-              <a:tabLst>
-                <a:tab pos="500063" algn="l"/>
-                <a:tab pos="1001713" algn="l"/>
-              </a:tabLst>
-            </a:pPr>
-            <a:r>
-              <a:rPr lang="cs-CZ" smtClean="0"/>
-              <a:t>15.	11.	2018</a:t>
-            </a:r>
-          </a:p>
-          <a:p>
-            <a:pPr marL="0" indent="0">
-              <a:buNone/>
-              <a:tabLst>
-                <a:tab pos="500063" algn="l"/>
-                <a:tab pos="1001713" algn="l"/>
-              </a:tabLst>
-            </a:pPr>
-            <a:r>
-              <a:rPr lang="cs-CZ" smtClean="0"/>
-              <a:t>22.	11.	2018</a:t>
-            </a:r>
-          </a:p>
-          <a:p>
-            <a:pPr marL="0" indent="0">
-              <a:buNone/>
-              <a:tabLst>
-                <a:tab pos="500063" algn="l"/>
-                <a:tab pos="1001713" algn="l"/>
-              </a:tabLst>
-            </a:pPr>
-            <a:r>
-              <a:rPr lang="cs-CZ" smtClean="0"/>
-              <a:t>29.	11.	2018</a:t>
-            </a:r>
-          </a:p>
-          <a:p>
-            <a:pPr marL="0" indent="0">
-              <a:buNone/>
-              <a:tabLst>
-                <a:tab pos="500063" algn="l"/>
-                <a:tab pos="1001713" algn="l"/>
-              </a:tabLst>
-            </a:pPr>
-            <a:r>
-              <a:rPr lang="cs-CZ" smtClean="0"/>
-              <a:t>  6.	12.	2018</a:t>
-            </a:r>
-          </a:p>
-          <a:p>
-            <a:pPr marL="0" indent="0">
-              <a:buNone/>
-              <a:tabLst>
-                <a:tab pos="500063" algn="l"/>
-                <a:tab pos="1001713" algn="l"/>
-              </a:tabLst>
-            </a:pPr>
-            <a:r>
-              <a:rPr lang="cs-CZ" smtClean="0"/>
-              <a:t>13.	12.	2018</a:t>
-            </a:r>
-          </a:p>
-          <a:p>
-            <a:pPr marL="0" indent="0">
-              <a:buNone/>
-              <a:tabLst>
-                <a:tab pos="500063" algn="l"/>
-                <a:tab pos="1001713" algn="l"/>
-              </a:tabLst>
-            </a:pPr>
-            <a:r>
-              <a:rPr lang="cs-CZ" smtClean="0"/>
-              <a:t>20.	12.	2018</a:t>
-            </a:r>
-            <a:endParaRPr lang="cs-CZ"/>
-          </a:p>
-        </p:txBody>
-      </p:sp>
-      <p:sp>
-        <p:nvSpPr>
-          <p:cNvPr id="5" name="Right Arrow 4"/>
-          <p:cNvSpPr/>
-          <p:nvPr/>
-        </p:nvSpPr>
-        <p:spPr>
-          <a:xfrm>
-            <a:off x="1127448" y="1304764"/>
-            <a:ext cx="432048" cy="396044"/>
-          </a:xfrm>
-          <a:prstGeom prst="rightArrow">
-            <a:avLst/>
-          </a:prstGeom>
-        </p:spPr>
-        <p:style>
-          <a:lnRef idx="2">
-            <a:schemeClr val="accent1">
-              <a:shade val="50000"/>
-            </a:schemeClr>
-          </a:lnRef>
-          <a:fillRef idx="1">
-            <a:schemeClr val="accent1"/>
-          </a:fillRef>
-          <a:effectRef idx="0">
-            <a:schemeClr val="accent1"/>
-          </a:effectRef>
-          <a:fontRef idx="minor">
-            <a:schemeClr val="lt1"/>
-          </a:fontRef>
-        </p:style>
-        <p:txBody>
-          <a:bodyPr rtlCol="0" anchor="ctr"/>
-          <a:lstStyle/>
-          <a:p>
-            <a:pPr algn="ctr"/>
-            <a:endParaRPr lang="cs-CZ"/>
-          </a:p>
-        </p:txBody>
-      </p:sp>
-    </p:spTree>
-    <p:extLst>
-      <p:ext uri="{BB962C8B-B14F-4D97-AF65-F5344CB8AC3E}">
-        <p14:creationId xmlns:p14="http://schemas.microsoft.com/office/powerpoint/2010/main" val="761195533"/>
-      </p:ext>
-    </p:extLst>
-  </p:cSld>
-  <p:clrMapOvr>
-    <a:masterClrMapping/>
-  </p:clrMapOvr>
-</p:sld>
-</file>
-
-<file path=ppt/slides/slide4.xml><?xml version="1.0" encoding="utf-8"?>
-<p:sld xmlns:a="http://schemas.openxmlformats.org/drawingml/2006/main" xmlns:r="http://schemas.openxmlformats.org/officeDocument/2006/relationships" xmlns:p="http://schemas.openxmlformats.org/presentationml/2006/main">
-  <p:cSld>
-    <p:spTree>
-      <p:nvGrpSpPr>
         <p:cNvPr id="1" name=""/>
         <p:cNvGrpSpPr/>
         <p:nvPr/>
@@ -5130,26 +4255,26 @@
               </a:spcBef>
             </a:pPr>
             <a:r>
-              <a:rPr lang="cs-CZ" smtClean="0"/>
+              <a:rPr lang="cs-CZ" dirty="0" smtClean="0"/>
               <a:t>Náš web</a:t>
             </a:r>
             <a:r>
-              <a:rPr lang="cs-CZ"/>
+              <a:rPr lang="cs-CZ" dirty="0"/>
               <a:t> </a:t>
             </a:r>
             <a:r>
-              <a:rPr lang="cs-CZ">
+              <a:rPr lang="cs-CZ" dirty="0">
                 <a:hlinkClick r:id="rId2"/>
               </a:rPr>
               <a:t>http://javabrno.czechitas.cz</a:t>
             </a:r>
             <a:r>
-              <a:rPr lang="cs-CZ" smtClean="0">
+              <a:rPr lang="cs-CZ" dirty="0" smtClean="0">
                 <a:hlinkClick r:id="rId2"/>
               </a:rPr>
               <a:t>/</a:t>
             </a:r>
-            <a:endParaRPr lang="cs-CZ" smtClean="0"/>
+            <a:endParaRPr lang="cs-CZ" dirty="0" smtClean="0"/>
           </a:p>
           <a:p>
             <a:pPr marL="363538" indent="-185738">
@@ -5160,7 +4285,7 @@
                 <a:spcPts val="0"/>
               </a:spcBef>
             </a:pPr>
-            <a:endParaRPr lang="cs-CZ" smtClean="0"/>
+            <a:endParaRPr lang="cs-CZ" dirty="0" smtClean="0"/>
           </a:p>
           <a:p>
             <a:pPr marL="363538" indent="-185738">
@@ -5172,62 +4297,80 @@
               </a:spcBef>
             </a:pPr>
             <a:r>
-              <a:rPr lang="cs-CZ" smtClean="0"/>
+              <a:rPr lang="cs-CZ" dirty="0" smtClean="0"/>
               <a:t>Nechte </a:t>
             </a:r>
             <a:r>
-              <a:rPr lang="cs-CZ"/>
+              <a:rPr lang="cs-CZ" dirty="0"/>
               <a:t>si hlídat změny na </a:t>
             </a:r>
             <a:r>
-              <a:rPr lang="cs-CZ" smtClean="0"/>
+              <a:rPr lang="cs-CZ" dirty="0" smtClean="0"/>
               <a:t>webu</a:t>
             </a:r>
             <a:br>
-              <a:rPr lang="cs-CZ" smtClean="0"/>
+              <a:rPr lang="cs-CZ" dirty="0" smtClean="0"/>
             </a:br>
             <a:r>
-              <a:rPr lang="cs-CZ" smtClean="0">
+              <a:rPr lang="cs-CZ" dirty="0" smtClean="0">
                 <a:hlinkClick r:id="rId3"/>
               </a:rPr>
               <a:t>http</a:t>
             </a:r>
             <a:r>
-              <a:rPr lang="cs-CZ">
+              <a:rPr lang="cs-CZ" dirty="0">
                 <a:hlinkClick r:id="rId3"/>
               </a:rPr>
               <a:t>://</a:t>
             </a:r>
             <a:r>
-              <a:rPr lang="cs-CZ" smtClean="0">
+              <a:rPr lang="cs-CZ" dirty="0" smtClean="0">
                 <a:hlinkClick r:id="rId3"/>
               </a:rPr>
-              <a:t>javabrno.czechitas.cz/2018-podzim/java1/</a:t>
+              <a:t>javabrno.czechitas.cz/201</a:t>
             </a:r>
             <a:r>
-              <a:rPr lang="cs-CZ"/>
+              <a:rPr lang="en-US" dirty="0" smtClean="0">
+                <a:hlinkClick r:id="rId3"/>
+              </a:rPr>
+              <a:t>9</a:t>
+            </a:r>
+            <a:r>
+              <a:rPr lang="cs-CZ" dirty="0" smtClean="0">
+                <a:hlinkClick r:id="rId3"/>
+              </a:rPr>
+              <a:t>-podzim/java1</a:t>
+            </a:r>
+            <a:r>
+              <a:rPr lang="cs-CZ" dirty="0" smtClean="0">
+                <a:hlinkClick r:id="rId3"/>
+              </a:rPr>
+              <a:t>/</a:t>
+            </a:r>
+            <a:r>
+              <a:rPr lang="cs-CZ" dirty="0"/>
               <a:t/>
             </a:r>
             <a:br>
-              <a:rPr lang="cs-CZ"/>
+              <a:rPr lang="cs-CZ" dirty="0"/>
             </a:br>
             <a:r>
-              <a:rPr lang="cs-CZ" smtClean="0"/>
+              <a:rPr lang="cs-CZ" dirty="0" smtClean="0"/>
               <a:t>pomocí </a:t>
             </a:r>
             <a:r>
-              <a:rPr lang="cs-CZ">
+              <a:rPr lang="cs-CZ" dirty="0">
                 <a:hlinkClick r:id="rId4"/>
               </a:rPr>
               <a:t>https://www.followthatpage.com</a:t>
             </a:r>
             <a:r>
-              <a:rPr lang="cs-CZ" smtClean="0">
+              <a:rPr lang="cs-CZ" dirty="0" smtClean="0">
                 <a:hlinkClick r:id="rId4"/>
               </a:rPr>
               <a:t>/</a:t>
             </a:r>
-            <a:endParaRPr lang="cs-CZ" smtClean="0"/>
+            <a:endParaRPr lang="cs-CZ" dirty="0" smtClean="0"/>
           </a:p>
           <a:p>
             <a:pPr marL="363538" indent="-185738">
@@ -5238,7 +4381,7 @@
                 <a:spcPts val="0"/>
               </a:spcBef>
             </a:pPr>
-            <a:endParaRPr lang="cs-CZ" smtClean="0"/>
+            <a:endParaRPr lang="cs-CZ" dirty="0" smtClean="0"/>
           </a:p>
           <a:p>
             <a:pPr marL="363538" indent="-185738">
@@ -5250,7 +4393,7 @@
               </a:spcBef>
             </a:pPr>
             <a:r>
-              <a:rPr lang="cs-CZ"/>
+              <a:rPr lang="cs-CZ" dirty="0"/>
               <a:t>Záznamy přednášek</a:t>
             </a:r>
           </a:p>
@@ -5263,7 +4406,7 @@
                 <a:spcPts val="0"/>
               </a:spcBef>
             </a:pPr>
-            <a:endParaRPr lang="cs-CZ"/>
+            <a:endParaRPr lang="cs-CZ" dirty="0"/>
           </a:p>
           <a:p>
             <a:pPr marL="363538" indent="-185738">
@@ -5275,7 +4418,7 @@
               </a:spcBef>
             </a:pPr>
             <a:r>
-              <a:rPr lang="cs-CZ" smtClean="0"/>
+              <a:rPr lang="cs-CZ" dirty="0" smtClean="0"/>
               <a:t>Facebooková skupina</a:t>
             </a:r>
           </a:p>
@@ -5288,7 +4431,7 @@
                 <a:spcPts val="0"/>
               </a:spcBef>
             </a:pPr>
-            <a:endParaRPr lang="cs-CZ"/>
+            <a:endParaRPr lang="cs-CZ" dirty="0"/>
           </a:p>
           <a:p>
             <a:pPr marL="363538" indent="-185738">
@@ -5300,10 +4443,10 @@
               </a:spcBef>
             </a:pPr>
             <a:r>
-              <a:rPr lang="cs-CZ" smtClean="0"/>
+              <a:rPr lang="cs-CZ" dirty="0" smtClean="0"/>
               <a:t>Domácí úkoly</a:t>
             </a:r>
-            <a:endParaRPr lang="cs-CZ"/>
+            <a:endParaRPr lang="cs-CZ" dirty="0"/>
           </a:p>
         </p:txBody>
       </p:sp>

</xml_diff>